<commit_message>
minor changes to ppt
</commit_message>
<xml_diff>
--- a/documentation/GroupPP.pptx
+++ b/documentation/GroupPP.pptx
@@ -8,12 +8,13 @@
     <p:sldId id="256" r:id="rId2"/>
     <p:sldId id="257" r:id="rId3"/>
     <p:sldId id="258" r:id="rId4"/>
-    <p:sldId id="259" r:id="rId5"/>
-    <p:sldId id="260" r:id="rId6"/>
-    <p:sldId id="261" r:id="rId7"/>
-    <p:sldId id="262" r:id="rId8"/>
-    <p:sldId id="263" r:id="rId9"/>
-    <p:sldId id="264" r:id="rId10"/>
+    <p:sldId id="265" r:id="rId5"/>
+    <p:sldId id="259" r:id="rId6"/>
+    <p:sldId id="260" r:id="rId7"/>
+    <p:sldId id="261" r:id="rId8"/>
+    <p:sldId id="262" r:id="rId9"/>
+    <p:sldId id="263" r:id="rId10"/>
+    <p:sldId id="264" r:id="rId11"/>
   </p:sldIdLst>
   <p:sldSz cx="12192000" cy="6858000"/>
   <p:notesSz cx="6858000" cy="9144000"/>
@@ -112,6 +113,11 @@
       </a:defRPr>
     </a:lvl9pPr>
   </p:defaultTextStyle>
+  <p:extLst>
+    <p:ext uri="{EFAFB233-063F-42B5-8137-9DF3F51BA10A}">
+      <p15:sldGuideLst xmlns:p15="http://schemas.microsoft.com/office/powerpoint/2012/main"/>
+    </p:ext>
+  </p:extLst>
 </p:presentation>
 </file>
 
@@ -254,7 +260,7 @@
           <a:p>
             <a:fld id="{48A87A34-81AB-432B-8DAE-1953F412C126}" type="datetimeFigureOut">
               <a:rPr lang="en-US" dirty="0"/>
-              <a:t>12/6/2016</a:t>
+              <a:t>12/7/2016</a:t>
             </a:fld>
             <a:endParaRPr lang="en-US" dirty="0"/>
           </a:p>
@@ -460,7 +466,7 @@
           <a:p>
             <a:fld id="{48A87A34-81AB-432B-8DAE-1953F412C126}" type="datetimeFigureOut">
               <a:rPr lang="en-US" dirty="0"/>
-              <a:t>12/6/2016</a:t>
+              <a:t>12/7/2016</a:t>
             </a:fld>
             <a:endParaRPr lang="en-US" dirty="0"/>
           </a:p>
@@ -670,7 +676,7 @@
           <a:p>
             <a:fld id="{48A87A34-81AB-432B-8DAE-1953F412C126}" type="datetimeFigureOut">
               <a:rPr lang="en-US" dirty="0"/>
-              <a:t>12/6/2016</a:t>
+              <a:t>12/7/2016</a:t>
             </a:fld>
             <a:endParaRPr lang="en-US" dirty="0"/>
           </a:p>
@@ -866,7 +872,7 @@
           <a:p>
             <a:fld id="{48A87A34-81AB-432B-8DAE-1953F412C126}" type="datetimeFigureOut">
               <a:rPr lang="en-US" dirty="0"/>
-              <a:t>12/6/2016</a:t>
+              <a:t>12/7/2016</a:t>
             </a:fld>
             <a:endParaRPr lang="en-US" dirty="0"/>
           </a:p>
@@ -1140,7 +1146,7 @@
           <a:p>
             <a:fld id="{48A87A34-81AB-432B-8DAE-1953F412C126}" type="datetimeFigureOut">
               <a:rPr lang="en-US" dirty="0"/>
-              <a:t>12/6/2016</a:t>
+              <a:t>12/7/2016</a:t>
             </a:fld>
             <a:endParaRPr lang="en-US" dirty="0"/>
           </a:p>
@@ -1403,7 +1409,7 @@
           <a:p>
             <a:fld id="{48A87A34-81AB-432B-8DAE-1953F412C126}" type="datetimeFigureOut">
               <a:rPr lang="en-US" dirty="0"/>
-              <a:t>12/6/2016</a:t>
+              <a:t>12/7/2016</a:t>
             </a:fld>
             <a:endParaRPr lang="en-US" dirty="0"/>
           </a:p>
@@ -1814,7 +1820,7 @@
           <a:p>
             <a:fld id="{48A87A34-81AB-432B-8DAE-1953F412C126}" type="datetimeFigureOut">
               <a:rPr lang="en-US" dirty="0"/>
-              <a:t>12/6/2016</a:t>
+              <a:t>12/7/2016</a:t>
             </a:fld>
             <a:endParaRPr lang="en-US" dirty="0"/>
           </a:p>
@@ -1958,7 +1964,7 @@
           <a:p>
             <a:fld id="{48A87A34-81AB-432B-8DAE-1953F412C126}" type="datetimeFigureOut">
               <a:rPr lang="en-US" dirty="0"/>
-              <a:t>12/6/2016</a:t>
+              <a:t>12/7/2016</a:t>
             </a:fld>
             <a:endParaRPr lang="en-US" dirty="0"/>
           </a:p>
@@ -2079,7 +2085,7 @@
           <a:p>
             <a:fld id="{48A87A34-81AB-432B-8DAE-1953F412C126}" type="datetimeFigureOut">
               <a:rPr lang="en-US" dirty="0"/>
-              <a:t>12/6/2016</a:t>
+              <a:t>12/7/2016</a:t>
             </a:fld>
             <a:endParaRPr lang="en-US" dirty="0"/>
           </a:p>
@@ -2325,7 +2331,7 @@
           <a:p>
             <a:fld id="{48A87A34-81AB-432B-8DAE-1953F412C126}" type="datetimeFigureOut">
               <a:rPr lang="en-US" dirty="0"/>
-              <a:t>12/6/2016</a:t>
+              <a:t>12/7/2016</a:t>
             </a:fld>
             <a:endParaRPr lang="en-US" dirty="0"/>
           </a:p>
@@ -2766,7 +2772,7 @@
             <a:fld id="{48A87A34-81AB-432B-8DAE-1953F412C126}" type="datetimeFigureOut">
               <a:rPr lang="en-US" dirty="0"/>
               <a:pPr/>
-              <a:t>12/6/2016</a:t>
+              <a:t>12/7/2016</a:t>
             </a:fld>
             <a:endParaRPr lang="en-US" dirty="0"/>
           </a:p>
@@ -3088,7 +3094,7 @@
             <a:fld id="{48A87A34-81AB-432B-8DAE-1953F412C126}" type="datetimeFigureOut">
               <a:rPr lang="en-US" dirty="0"/>
               <a:pPr/>
-              <a:t>12/6/2016</a:t>
+              <a:t>12/7/2016</a:t>
             </a:fld>
             <a:endParaRPr lang="en-US" dirty="0"/>
           </a:p>
@@ -3636,6 +3642,117 @@
 </p:sld>
 </file>
 
+<file path=ppt/slides/slide10.xml><?xml version="1.0" encoding="utf-8"?>
+<p:sld xmlns:a="http://schemas.openxmlformats.org/drawingml/2006/main" xmlns:r="http://schemas.openxmlformats.org/officeDocument/2006/relationships" xmlns:p="http://schemas.openxmlformats.org/presentationml/2006/main">
+  <p:cSld>
+    <p:spTree>
+      <p:nvGrpSpPr>
+        <p:cNvPr id="1" name=""/>
+        <p:cNvGrpSpPr/>
+        <p:nvPr/>
+      </p:nvGrpSpPr>
+      <p:grpSpPr>
+        <a:xfrm>
+          <a:off x="0" y="0"/>
+          <a:ext cx="0" cy="0"/>
+          <a:chOff x="0" y="0"/>
+          <a:chExt cx="0" cy="0"/>
+        </a:xfrm>
+      </p:grpSpPr>
+      <p:sp>
+        <p:nvSpPr>
+          <p:cNvPr id="2" name="Title 1"/>
+          <p:cNvSpPr>
+            <a:spLocks noGrp="1"/>
+          </p:cNvSpPr>
+          <p:nvPr>
+            <p:ph type="title"/>
+          </p:nvPr>
+        </p:nvSpPr>
+        <p:spPr/>
+        <p:txBody>
+          <a:bodyPr/>
+          <a:lstStyle/>
+          <a:p>
+            <a:r>
+              <a:rPr lang="en-US" dirty="0"/>
+              <a:t>What did we learn?</a:t>
+            </a:r>
+          </a:p>
+        </p:txBody>
+      </p:sp>
+      <p:sp>
+        <p:nvSpPr>
+          <p:cNvPr id="3" name="Content Placeholder 2"/>
+          <p:cNvSpPr>
+            <a:spLocks noGrp="1"/>
+          </p:cNvSpPr>
+          <p:nvPr>
+            <p:ph idx="1"/>
+          </p:nvPr>
+        </p:nvSpPr>
+        <p:spPr>
+          <a:xfrm>
+            <a:off x="1451579" y="2015732"/>
+            <a:ext cx="9603275" cy="3724668"/>
+          </a:xfrm>
+        </p:spPr>
+        <p:txBody>
+          <a:bodyPr>
+            <a:normAutofit/>
+          </a:bodyPr>
+          <a:lstStyle/>
+          <a:p>
+            <a:r>
+              <a:rPr lang="en-US" dirty="0"/>
+              <a:t>Those “minor” features can get out of hand real quick.</a:t>
+            </a:r>
+          </a:p>
+          <a:p>
+            <a:r>
+              <a:rPr lang="en-US" dirty="0"/>
+              <a:t>Sometimes what you want to do can get trumped by what a system is capable of.</a:t>
+            </a:r>
+          </a:p>
+          <a:p>
+            <a:r>
+              <a:rPr lang="en-US" dirty="0"/>
+              <a:t>Communication is key within the group.</a:t>
+            </a:r>
+          </a:p>
+          <a:p>
+            <a:r>
+              <a:rPr lang="en-US" dirty="0"/>
+              <a:t>As unimportant as it may seem sometimes, don’t neglect your UI.</a:t>
+            </a:r>
+          </a:p>
+          <a:p>
+            <a:r>
+              <a:rPr lang="en-US" dirty="0"/>
+              <a:t>Designing how each system plays with each other can save a huge headache down the road.</a:t>
+            </a:r>
+          </a:p>
+          <a:p>
+            <a:r>
+              <a:rPr lang="en-US" dirty="0"/>
+              <a:t>Ambitious projects such as this aren’t suited particularly well for class projects.</a:t>
+            </a:r>
+          </a:p>
+        </p:txBody>
+      </p:sp>
+    </p:spTree>
+    <p:extLst>
+      <p:ext uri="{BB962C8B-B14F-4D97-AF65-F5344CB8AC3E}">
+        <p14:creationId xmlns:p14="http://schemas.microsoft.com/office/powerpoint/2010/main" val="1931478075"/>
+      </p:ext>
+    </p:extLst>
+  </p:cSld>
+  <p:clrMapOvr>
+    <a:masterClrMapping/>
+  </p:clrMapOvr>
+</p:sld>
+</file>
+
 <file path=ppt/slides/slide2.xml><?xml version="1.0" encoding="utf-8"?>
 <p:sld xmlns:a="http://schemas.openxmlformats.org/drawingml/2006/main" xmlns:r="http://schemas.openxmlformats.org/officeDocument/2006/relationships" xmlns:p="http://schemas.openxmlformats.org/presentationml/2006/main">
   <p:cSld>
@@ -3778,14 +3895,6 @@
             </a:r>
             <a:r>
               <a:rPr lang="en-US" dirty="0" err="1"/>
-              <a:t>teamy</a:t>
-            </a:r>
-            <a:r>
-              <a:rPr lang="en-US" dirty="0"/>
-              <a:t> </a:t>
-            </a:r>
-            <a:r>
-              <a:rPr lang="en-US" dirty="0" err="1"/>
               <a:t>weamy</a:t>
             </a:r>
             <a:r>
@@ -3810,21 +3919,13 @@
           <a:bodyPr/>
           <a:lstStyle/>
           <a:p>
-            <a:r>
-              <a:rPr lang="en-US" dirty="0" err="1"/>
-              <a:t>Teamy</a:t>
-            </a:r>
-            <a:r>
-              <a:rPr lang="en-US" dirty="0"/>
-              <a:t> </a:t>
-            </a:r>
             <a:r>
               <a:rPr lang="en-US" dirty="0" err="1"/>
               <a:t>Weamy</a:t>
             </a:r>
             <a:r>
               <a:rPr lang="en-US" dirty="0"/>
-              <a:t> (TW) is a social media hub.</a:t>
+              <a:t> is a social media hub.</a:t>
             </a:r>
           </a:p>
           <a:p>
@@ -3843,14 +3944,6 @@
             <a:r>
               <a:rPr lang="en-US" dirty="0"/>
               <a:t>Currently </a:t>
-            </a:r>
-            <a:r>
-              <a:rPr lang="en-US" dirty="0" err="1"/>
-              <a:t>Teamy</a:t>
-            </a:r>
-            <a:r>
-              <a:rPr lang="en-US" dirty="0"/>
-              <a:t> </a:t>
             </a:r>
             <a:r>
               <a:rPr lang="en-US" dirty="0" err="1"/>
@@ -3918,7 +4011,7 @@
           <a:p>
             <a:r>
               <a:rPr lang="en-US" dirty="0"/>
-              <a:t>What’s missing and why?</a:t>
+              <a:t>Video demo</a:t>
             </a:r>
           </a:p>
         </p:txBody>
@@ -3939,30 +4032,19 @@
           <a:lstStyle/>
           <a:p>
             <a:r>
-              <a:rPr lang="en-US" dirty="0"/>
-              <a:t>One of our big targets from inception up until we realized it wouldn’t happen was Facebook. Being the largest social media platform it was obviously on our hit list from the outset.</a:t>
-            </a:r>
-          </a:p>
-          <a:p>
-            <a:r>
-              <a:rPr lang="en-US" dirty="0"/>
-              <a:t>So why didn’t we integrate it? Well, it turns out that Facebook doesn’t like third party applications playing with it or its information. Facebook completely shut out 3</a:t>
-            </a:r>
-            <a:r>
-              <a:rPr lang="en-US" baseline="30000" dirty="0"/>
-              <a:t>rd</a:t>
-            </a:r>
-            <a:r>
-              <a:rPr lang="en-US" dirty="0"/>
-              <a:t> party applications for a variety of reasons. Without and API’s to work with it was unbelievably difficult to try to access anything. Oh and there was also the threat of a lawsuit, that was pretty effective at keeping us out.</a:t>
-            </a:r>
+              <a:rPr lang="en-US" dirty="0">
+                <a:hlinkClick r:id="rId2"/>
+              </a:rPr>
+              <a:t>https://youtu.be/_uxtou675j0</a:t>
+            </a:r>
+            <a:endParaRPr lang="en-US" dirty="0"/>
           </a:p>
         </p:txBody>
       </p:sp>
     </p:spTree>
     <p:extLst>
       <p:ext uri="{BB962C8B-B14F-4D97-AF65-F5344CB8AC3E}">
-        <p14:creationId xmlns:p14="http://schemas.microsoft.com/office/powerpoint/2010/main" val="69695772"/>
+        <p14:creationId xmlns:p14="http://schemas.microsoft.com/office/powerpoint/2010/main" val="595489301"/>
       </p:ext>
     </p:extLst>
   </p:cSld>
@@ -4006,7 +4088,7 @@
           <a:p>
             <a:r>
               <a:rPr lang="en-US" dirty="0"/>
-              <a:t>So what can it do.</a:t>
+              <a:t>What’s missing and why?</a:t>
             </a:r>
           </a:p>
         </p:txBody>
@@ -4028,27 +4110,21 @@
           <a:p>
             <a:r>
               <a:rPr lang="en-US" dirty="0"/>
-              <a:t>The three main features currently available are </a:t>
-            </a:r>
-            <a:r>
-              <a:rPr lang="en-US" dirty="0" err="1"/>
-              <a:t>Youtube</a:t>
-            </a:r>
-            <a:r>
-              <a:rPr lang="en-US" dirty="0"/>
-              <a:t>, Twitch, and Reminders.</a:t>
-            </a:r>
-          </a:p>
-          <a:p>
-            <a:r>
-              <a:rPr lang="en-US" dirty="0"/>
-              <a:t>For each of the three we had a certain set of test cases that we wanted met.</a:t>
-            </a:r>
-          </a:p>
-          <a:p>
-            <a:r>
-              <a:rPr lang="en-US" dirty="0"/>
-              <a:t>Almost all of our test cases made it to completion.</a:t>
+              <a:t>One of our big targets from inception up until we realized it wouldn’t happen was Facebook. Being the largest social media platform it was obviously on our hit list from the outset.</a:t>
+            </a:r>
+          </a:p>
+          <a:p>
+            <a:r>
+              <a:rPr lang="en-US" dirty="0"/>
+              <a:t>So why didn’t we integrate it? Well, it turns out that Facebook doesn’t like third party applications playing with it or its information. Facebook completely shut out 3</a:t>
+            </a:r>
+            <a:r>
+              <a:rPr lang="en-US" baseline="30000" dirty="0"/>
+              <a:t>rd</a:t>
+            </a:r>
+            <a:r>
+              <a:rPr lang="en-US" dirty="0"/>
+              <a:t> party applications for a variety of reasons. Without and API’s to work with it was unbelievably difficult to try to access anything. Oh and there was also the threat of a lawsuit, that was pretty effective at keeping us out.</a:t>
             </a:r>
           </a:p>
         </p:txBody>
@@ -4056,7 +4132,7 @@
     </p:spTree>
     <p:extLst>
       <p:ext uri="{BB962C8B-B14F-4D97-AF65-F5344CB8AC3E}">
-        <p14:creationId xmlns:p14="http://schemas.microsoft.com/office/powerpoint/2010/main" val="1348680350"/>
+        <p14:creationId xmlns:p14="http://schemas.microsoft.com/office/powerpoint/2010/main" val="69695772"/>
       </p:ext>
     </p:extLst>
   </p:cSld>
@@ -4100,7 +4176,7 @@
           <a:p>
             <a:r>
               <a:rPr lang="en-US" dirty="0"/>
-              <a:t>Test Cases</a:t>
+              <a:t>So what can it do.</a:t>
             </a:r>
           </a:p>
         </p:txBody>
@@ -4117,32 +4193,12 @@
         </p:nvSpPr>
         <p:spPr/>
         <p:txBody>
-          <a:bodyPr>
-            <a:normAutofit lnSpcReduction="10000"/>
-          </a:bodyPr>
-          <a:lstStyle/>
-          <a:p>
-            <a:r>
-              <a:rPr lang="en-US" dirty="0"/>
-              <a:t>When the one of the user’s feeds has new content a windows notification should appear. </a:t>
-            </a:r>
-          </a:p>
-          <a:p>
-            <a:r>
-              <a:rPr lang="en-US" dirty="0"/>
-              <a:t>User pushes note button a window should appear to let the user take a note.</a:t>
-            </a:r>
-          </a:p>
-          <a:p>
-            <a:r>
-              <a:rPr lang="en-US" dirty="0"/>
-              <a:t>If user clicks on an option in the twitch or YouTube from a web browser should launch that option.</a:t>
-            </a:r>
-          </a:p>
-          <a:p>
-            <a:r>
-              <a:rPr lang="en-US" dirty="0"/>
-              <a:t>If the user hits settings option it should switch to an interactive options screen where user can set their Twitch Channel name as well as their </a:t>
+          <a:bodyPr/>
+          <a:lstStyle/>
+          <a:p>
+            <a:r>
+              <a:rPr lang="en-US" dirty="0"/>
+              <a:t>The three main features currently available are </a:t>
             </a:r>
             <a:r>
               <a:rPr lang="en-US" dirty="0" err="1"/>
@@ -4150,13 +4206,19 @@
             </a:r>
             <a:r>
               <a:rPr lang="en-US" dirty="0"/>
-              <a:t> Channel ID.</a:t>
-            </a:r>
-          </a:p>
-          <a:p>
-            <a:r>
-              <a:rPr lang="en-US" dirty="0"/>
-              <a:t>If the user doesn’t know how to get it a Help option is there to instruct user on how to get it.</a:t>
+              <a:t>, Twitch, and Reminders.</a:t>
+            </a:r>
+          </a:p>
+          <a:p>
+            <a:r>
+              <a:rPr lang="en-US" dirty="0"/>
+              <a:t>For each of the three we had a certain set of test cases that we wanted met.</a:t>
+            </a:r>
+          </a:p>
+          <a:p>
+            <a:r>
+              <a:rPr lang="en-US" dirty="0"/>
+              <a:t>Almost all of our test cases made it to completion.</a:t>
             </a:r>
           </a:p>
         </p:txBody>
@@ -4164,7 +4226,7 @@
     </p:spTree>
     <p:extLst>
       <p:ext uri="{BB962C8B-B14F-4D97-AF65-F5344CB8AC3E}">
-        <p14:creationId xmlns:p14="http://schemas.microsoft.com/office/powerpoint/2010/main" val="2519369242"/>
+        <p14:creationId xmlns:p14="http://schemas.microsoft.com/office/powerpoint/2010/main" val="1348680350"/>
       </p:ext>
     </p:extLst>
   </p:cSld>
@@ -4208,7 +4270,7 @@
           <a:p>
             <a:r>
               <a:rPr lang="en-US" dirty="0"/>
-              <a:t>Design</a:t>
+              <a:t>Test Cases</a:t>
             </a:r>
           </a:p>
         </p:txBody>
@@ -4223,40 +4285,74 @@
             <p:ph idx="1"/>
           </p:nvPr>
         </p:nvSpPr>
-        <p:spPr/>
-        <p:txBody>
-          <a:bodyPr/>
-          <a:lstStyle/>
-          <a:p>
-            <a:r>
-              <a:rPr lang="en-US" dirty="0"/>
-              <a:t>The design idea for this project was to keep it simple.</a:t>
-            </a:r>
-          </a:p>
-          <a:p>
-            <a:r>
-              <a:rPr lang="en-US" dirty="0"/>
-              <a:t>Inundating the user with a ton of options seemed unnecessary and overwhelming as the idea of the program is to simplify the users life, not make it more complicated.</a:t>
-            </a:r>
-          </a:p>
-          <a:p>
-            <a:r>
-              <a:rPr lang="en-US" dirty="0"/>
-              <a:t>Each of the social media outlets has it’s own dedicated feed so the user can distinguish between which is which.</a:t>
-            </a:r>
-          </a:p>
-          <a:p>
-            <a:r>
-              <a:rPr lang="en-US" dirty="0"/>
-              <a:t>The blue and white color scheme was meant to be a day time color scheme, had there been more time we would’ve implemented a night mode color scheme that would have switched based on time.</a:t>
-            </a:r>
+        <p:spPr>
+          <a:xfrm>
+            <a:off x="1451579" y="2015732"/>
+            <a:ext cx="9603275" cy="4004068"/>
+          </a:xfrm>
+        </p:spPr>
+        <p:txBody>
+          <a:bodyPr>
+            <a:normAutofit fontScale="92500" lnSpcReduction="10000"/>
+          </a:bodyPr>
+          <a:lstStyle/>
+          <a:p>
+            <a:r>
+              <a:rPr lang="en-US" dirty="0"/>
+              <a:t>When the one of the user’s feeds has new content a windows notification should appear. </a:t>
+            </a:r>
+          </a:p>
+          <a:p>
+            <a:r>
+              <a:rPr lang="en-US" dirty="0"/>
+              <a:t>User pushes note button a window should appear to let the user take a note.</a:t>
+            </a:r>
+          </a:p>
+          <a:p>
+            <a:r>
+              <a:rPr lang="en-US" dirty="0"/>
+              <a:t>If user clicks on an option in the twitch or YouTube from a web browser should launch that option.</a:t>
+            </a:r>
+          </a:p>
+          <a:p>
+            <a:r>
+              <a:rPr lang="en-US" dirty="0"/>
+              <a:t>If the user hits settings option it should switch to an interactive options screen where user can set their Twitch Channel name as well as their </a:t>
+            </a:r>
+            <a:r>
+              <a:rPr lang="en-US" dirty="0" err="1"/>
+              <a:t>Youtube</a:t>
+            </a:r>
+            <a:r>
+              <a:rPr lang="en-US" dirty="0"/>
+              <a:t> Channel ID.</a:t>
+            </a:r>
+          </a:p>
+          <a:p>
+            <a:r>
+              <a:rPr lang="en-US" dirty="0"/>
+              <a:t>If the user doesn’t know how to get it a Help option is there to instruct user on how to get it.</a:t>
+            </a:r>
+          </a:p>
+          <a:p>
+            <a:r>
+              <a:rPr lang="en-US" dirty="0">
+                <a:hlinkClick r:id="rId2"/>
+              </a:rPr>
+              <a:t>https://docs.google.com/spreadsheets/d/1XV2HtPTw_4N3Q7FqMf_fpwOvDmCXDWCmsUZH1GKCQL8/edit#gid=2146932090</a:t>
+            </a:r>
+            <a:r>
+              <a:rPr lang="en-US" dirty="0"/>
+              <a:t> </a:t>
+            </a:r>
+            <a:endParaRPr lang="en-US" dirty="0"/>
           </a:p>
         </p:txBody>
       </p:sp>
     </p:spTree>
     <p:extLst>
       <p:ext uri="{BB962C8B-B14F-4D97-AF65-F5344CB8AC3E}">
-        <p14:creationId xmlns:p14="http://schemas.microsoft.com/office/powerpoint/2010/main" val="797472300"/>
+        <p14:creationId xmlns:p14="http://schemas.microsoft.com/office/powerpoint/2010/main" val="2519369242"/>
       </p:ext>
     </p:extLst>
   </p:cSld>
@@ -4300,7 +4396,7 @@
           <a:p>
             <a:r>
               <a:rPr lang="en-US" dirty="0"/>
-              <a:t>What else didn’t make it but could’ve with more time.</a:t>
+              <a:t>Design</a:t>
             </a:r>
           </a:p>
         </p:txBody>
@@ -4322,47 +4418,33 @@
           <a:p>
             <a:r>
               <a:rPr lang="en-US" dirty="0"/>
-              <a:t>Twitter</a:t>
-            </a:r>
-          </a:p>
-          <a:p>
-            <a:r>
-              <a:rPr lang="en-US" dirty="0"/>
-              <a:t>Persistent Notes</a:t>
-            </a:r>
-          </a:p>
-          <a:p>
-            <a:r>
-              <a:rPr lang="en-US" dirty="0"/>
-              <a:t>Google </a:t>
-            </a:r>
-            <a:r>
-              <a:rPr lang="en-US" dirty="0" err="1"/>
-              <a:t>Calender</a:t>
-            </a:r>
-            <a:endParaRPr lang="en-US" dirty="0"/>
-          </a:p>
-          <a:p>
-            <a:r>
-              <a:rPr lang="en-US" dirty="0"/>
-              <a:t>Multiplatform</a:t>
-            </a:r>
-          </a:p>
-          <a:p>
-            <a:r>
-              <a:rPr lang="en-US" dirty="0"/>
-              <a:t>Web based storage.</a:t>
-            </a:r>
-          </a:p>
-          <a:p>
-            <a:endParaRPr lang="en-US" dirty="0"/>
+              <a:t>The design idea for this project was to keep it simple.</a:t>
+            </a:r>
+          </a:p>
+          <a:p>
+            <a:r>
+              <a:rPr lang="en-US" dirty="0"/>
+              <a:t>Inundating the user with a ton of options seemed unnecessary and overwhelming as the idea of the program is to simplify the users life, not make it more complicated.</a:t>
+            </a:r>
+          </a:p>
+          <a:p>
+            <a:r>
+              <a:rPr lang="en-US" dirty="0"/>
+              <a:t>Each of the social media outlets has it’s own dedicated feed so the user can distinguish between which is which.</a:t>
+            </a:r>
+          </a:p>
+          <a:p>
+            <a:r>
+              <a:rPr lang="en-US" dirty="0"/>
+              <a:t>The blue and white color scheme was meant to be a day time color scheme, had there been more time we would’ve implemented a night mode color scheme that would have switched based on time.</a:t>
+            </a:r>
           </a:p>
         </p:txBody>
       </p:sp>
     </p:spTree>
     <p:extLst>
       <p:ext uri="{BB962C8B-B14F-4D97-AF65-F5344CB8AC3E}">
-        <p14:creationId xmlns:p14="http://schemas.microsoft.com/office/powerpoint/2010/main" val="2892665335"/>
+        <p14:creationId xmlns:p14="http://schemas.microsoft.com/office/powerpoint/2010/main" val="797472300"/>
       </p:ext>
     </p:extLst>
   </p:cSld>
@@ -4406,7 +4488,7 @@
           <a:p>
             <a:r>
               <a:rPr lang="en-US" dirty="0"/>
-              <a:t>What did we learn?</a:t>
+              <a:t>What else didn’t make it but could’ve with more time.</a:t>
             </a:r>
           </a:p>
         </p:txBody>
@@ -4428,36 +4510,45 @@
           <a:p>
             <a:r>
               <a:rPr lang="en-US" dirty="0"/>
-              <a:t>Those “minor” features can get out of hand real quick.</a:t>
-            </a:r>
-          </a:p>
-          <a:p>
-            <a:r>
-              <a:rPr lang="en-US" dirty="0"/>
-              <a:t>Sometimes what you want to do can get trumped by what a system is capable of.</a:t>
-            </a:r>
-          </a:p>
-          <a:p>
-            <a:r>
-              <a:rPr lang="en-US" dirty="0"/>
-              <a:t>Communication is key within the group.</a:t>
-            </a:r>
-          </a:p>
-          <a:p>
-            <a:r>
-              <a:rPr lang="en-US" dirty="0"/>
-              <a:t>As unimportant as it may seem sometimes, don’t neglect your UI.</a:t>
-            </a:r>
-          </a:p>
-          <a:p>
-            <a:r>
-              <a:rPr lang="en-US" dirty="0"/>
-              <a:t>Designing how each system plays with each other can save a huge headache down </a:t>
-            </a:r>
-            <a:r>
-              <a:rPr lang="en-US"/>
-              <a:t>the road.</a:t>
-            </a:r>
+              <a:t>Twitter</a:t>
+            </a:r>
+          </a:p>
+          <a:p>
+            <a:r>
+              <a:rPr lang="en-US" dirty="0"/>
+              <a:t>Google </a:t>
+            </a:r>
+            <a:r>
+              <a:rPr lang="en-US" dirty="0" err="1"/>
+              <a:t>Calender</a:t>
+            </a:r>
+            <a:endParaRPr lang="en-US" dirty="0"/>
+          </a:p>
+          <a:p>
+            <a:r>
+              <a:rPr lang="en-US" dirty="0"/>
+              <a:t>Multiplatform</a:t>
+            </a:r>
+          </a:p>
+          <a:p>
+            <a:r>
+              <a:rPr lang="en-US" dirty="0"/>
+              <a:t>Web based storage</a:t>
+            </a:r>
+          </a:p>
+          <a:p>
+            <a:r>
+              <a:rPr lang="en-US" dirty="0"/>
+              <a:t>User Documentation</a:t>
+            </a:r>
+          </a:p>
+          <a:p>
+            <a:r>
+              <a:rPr lang="en-US" dirty="0"/>
+              <a:t>Optimization of Existing Features</a:t>
+            </a:r>
+          </a:p>
+          <a:p>
             <a:endParaRPr lang="en-US" dirty="0"/>
           </a:p>
         </p:txBody>
@@ -4465,7 +4556,7 @@
     </p:spTree>
     <p:extLst>
       <p:ext uri="{BB962C8B-B14F-4D97-AF65-F5344CB8AC3E}">
-        <p14:creationId xmlns:p14="http://schemas.microsoft.com/office/powerpoint/2010/main" val="1931478075"/>
+        <p14:creationId xmlns:p14="http://schemas.microsoft.com/office/powerpoint/2010/main" val="2892665335"/>
       </p:ext>
     </p:extLst>
   </p:cSld>

</xml_diff>